<commit_message>
realized ball running and stopping
</commit_message>
<xml_diff>
--- a/resources/bg.pptx
+++ b/resources/bg.pptx
@@ -104,6 +104,11 @@
       </a:defRPr>
     </a:lvl9pPr>
   </p:defaultTextStyle>
+  <p:extLst>
+    <p:ext uri="{EFAFB233-063F-42B5-8137-9DF3F51BA10A}">
+      <p15:sldGuideLst xmlns:p15="http://schemas.microsoft.com/office/powerpoint/2012/main"/>
+    </p:ext>
+  </p:extLst>
 </p:presentation>
 </file>
 
@@ -254,7 +259,7 @@
           <a:p>
             <a:fld id="{1FBF89B6-86A3-2348-B696-5ED5C9B2DC36}" type="datetimeFigureOut">
               <a:rPr kumimoji="1" lang="zh-CN" altLang="en-US" smtClean="0"/>
-              <a:t>2019/5/30</a:t>
+              <a:t>2019/5/31</a:t>
             </a:fld>
             <a:endParaRPr kumimoji="1" lang="zh-CN" altLang="en-US"/>
           </a:p>
@@ -427,7 +432,7 @@
           <a:p>
             <a:fld id="{1FBF89B6-86A3-2348-B696-5ED5C9B2DC36}" type="datetimeFigureOut">
               <a:rPr kumimoji="1" lang="zh-CN" altLang="en-US" smtClean="0"/>
-              <a:t>2019/5/30</a:t>
+              <a:t>2019/5/31</a:t>
             </a:fld>
             <a:endParaRPr kumimoji="1" lang="zh-CN" altLang="en-US"/>
           </a:p>
@@ -610,7 +615,7 @@
           <a:p>
             <a:fld id="{1FBF89B6-86A3-2348-B696-5ED5C9B2DC36}" type="datetimeFigureOut">
               <a:rPr kumimoji="1" lang="zh-CN" altLang="en-US" smtClean="0"/>
-              <a:t>2019/5/30</a:t>
+              <a:t>2019/5/31</a:t>
             </a:fld>
             <a:endParaRPr kumimoji="1" lang="zh-CN" altLang="en-US"/>
           </a:p>
@@ -783,7 +788,7 @@
           <a:p>
             <a:fld id="{1FBF89B6-86A3-2348-B696-5ED5C9B2DC36}" type="datetimeFigureOut">
               <a:rPr kumimoji="1" lang="zh-CN" altLang="en-US" smtClean="0"/>
-              <a:t>2019/5/30</a:t>
+              <a:t>2019/5/31</a:t>
             </a:fld>
             <a:endParaRPr kumimoji="1" lang="zh-CN" altLang="en-US"/>
           </a:p>
@@ -1061,7 +1066,7 @@
           <a:p>
             <a:fld id="{1FBF89B6-86A3-2348-B696-5ED5C9B2DC36}" type="datetimeFigureOut">
               <a:rPr kumimoji="1" lang="zh-CN" altLang="en-US" smtClean="0"/>
-              <a:t>2019/5/30</a:t>
+              <a:t>2019/5/31</a:t>
             </a:fld>
             <a:endParaRPr kumimoji="1" lang="zh-CN" altLang="en-US"/>
           </a:p>
@@ -1276,7 +1281,7 @@
           <a:p>
             <a:fld id="{1FBF89B6-86A3-2348-B696-5ED5C9B2DC36}" type="datetimeFigureOut">
               <a:rPr kumimoji="1" lang="zh-CN" altLang="en-US" smtClean="0"/>
-              <a:t>2019/5/30</a:t>
+              <a:t>2019/5/31</a:t>
             </a:fld>
             <a:endParaRPr kumimoji="1" lang="zh-CN" altLang="en-US"/>
           </a:p>
@@ -1644,7 +1649,7 @@
           <a:p>
             <a:fld id="{1FBF89B6-86A3-2348-B696-5ED5C9B2DC36}" type="datetimeFigureOut">
               <a:rPr kumimoji="1" lang="zh-CN" altLang="en-US" smtClean="0"/>
-              <a:t>2019/5/30</a:t>
+              <a:t>2019/5/31</a:t>
             </a:fld>
             <a:endParaRPr kumimoji="1" lang="zh-CN" altLang="en-US"/>
           </a:p>
@@ -1785,7 +1790,7 @@
           <a:p>
             <a:fld id="{1FBF89B6-86A3-2348-B696-5ED5C9B2DC36}" type="datetimeFigureOut">
               <a:rPr kumimoji="1" lang="zh-CN" altLang="en-US" smtClean="0"/>
-              <a:t>2019/5/30</a:t>
+              <a:t>2019/5/31</a:t>
             </a:fld>
             <a:endParaRPr kumimoji="1" lang="zh-CN" altLang="en-US"/>
           </a:p>
@@ -1898,7 +1903,7 @@
           <a:p>
             <a:fld id="{1FBF89B6-86A3-2348-B696-5ED5C9B2DC36}" type="datetimeFigureOut">
               <a:rPr kumimoji="1" lang="zh-CN" altLang="en-US" smtClean="0"/>
-              <a:t>2019/5/30</a:t>
+              <a:t>2019/5/31</a:t>
             </a:fld>
             <a:endParaRPr kumimoji="1" lang="zh-CN" altLang="en-US"/>
           </a:p>
@@ -2187,7 +2192,7 @@
           <a:p>
             <a:fld id="{1FBF89B6-86A3-2348-B696-5ED5C9B2DC36}" type="datetimeFigureOut">
               <a:rPr kumimoji="1" lang="zh-CN" altLang="en-US" smtClean="0"/>
-              <a:t>2019/5/30</a:t>
+              <a:t>2019/5/31</a:t>
             </a:fld>
             <a:endParaRPr kumimoji="1" lang="zh-CN" altLang="en-US"/>
           </a:p>
@@ -2478,7 +2483,7 @@
           <a:p>
             <a:fld id="{1FBF89B6-86A3-2348-B696-5ED5C9B2DC36}" type="datetimeFigureOut">
               <a:rPr kumimoji="1" lang="zh-CN" altLang="en-US" smtClean="0"/>
-              <a:t>2019/5/30</a:t>
+              <a:t>2019/5/31</a:t>
             </a:fld>
             <a:endParaRPr kumimoji="1" lang="zh-CN" altLang="en-US"/>
           </a:p>
@@ -2694,7 +2699,7 @@
           <a:p>
             <a:fld id="{1FBF89B6-86A3-2348-B696-5ED5C9B2DC36}" type="datetimeFigureOut">
               <a:rPr kumimoji="1" lang="zh-CN" altLang="en-US" smtClean="0"/>
-              <a:t>2019/5/30</a:t>
+              <a:t>2019/5/31</a:t>
             </a:fld>
             <a:endParaRPr kumimoji="1" lang="zh-CN" altLang="en-US"/>
           </a:p>
@@ -3163,7 +3168,7 @@
         </p:blipFill>
         <p:spPr>
           <a:xfrm>
-            <a:off x="3011715" y="2471057"/>
+            <a:off x="3011715" y="3003320"/>
             <a:ext cx="6502400" cy="3657600"/>
           </a:xfrm>
           <a:prstGeom prst="rect">

</xml_diff>

<commit_message>
finished final version for .jar
</commit_message>
<xml_diff>
--- a/resources/bg.pptx
+++ b/resources/bg.pptx
@@ -259,7 +259,7 @@
           <a:p>
             <a:fld id="{1FBF89B6-86A3-2348-B696-5ED5C9B2DC36}" type="datetimeFigureOut">
               <a:rPr kumimoji="1" lang="zh-CN" altLang="en-US" smtClean="0"/>
-              <a:t>2019/5/31</a:t>
+              <a:t>2019/6/6</a:t>
             </a:fld>
             <a:endParaRPr kumimoji="1" lang="zh-CN" altLang="en-US"/>
           </a:p>
@@ -432,7 +432,7 @@
           <a:p>
             <a:fld id="{1FBF89B6-86A3-2348-B696-5ED5C9B2DC36}" type="datetimeFigureOut">
               <a:rPr kumimoji="1" lang="zh-CN" altLang="en-US" smtClean="0"/>
-              <a:t>2019/5/31</a:t>
+              <a:t>2019/6/6</a:t>
             </a:fld>
             <a:endParaRPr kumimoji="1" lang="zh-CN" altLang="en-US"/>
           </a:p>
@@ -615,7 +615,7 @@
           <a:p>
             <a:fld id="{1FBF89B6-86A3-2348-B696-5ED5C9B2DC36}" type="datetimeFigureOut">
               <a:rPr kumimoji="1" lang="zh-CN" altLang="en-US" smtClean="0"/>
-              <a:t>2019/5/31</a:t>
+              <a:t>2019/6/6</a:t>
             </a:fld>
             <a:endParaRPr kumimoji="1" lang="zh-CN" altLang="en-US"/>
           </a:p>
@@ -788,7 +788,7 @@
           <a:p>
             <a:fld id="{1FBF89B6-86A3-2348-B696-5ED5C9B2DC36}" type="datetimeFigureOut">
               <a:rPr kumimoji="1" lang="zh-CN" altLang="en-US" smtClean="0"/>
-              <a:t>2019/5/31</a:t>
+              <a:t>2019/6/6</a:t>
             </a:fld>
             <a:endParaRPr kumimoji="1" lang="zh-CN" altLang="en-US"/>
           </a:p>
@@ -1066,7 +1066,7 @@
           <a:p>
             <a:fld id="{1FBF89B6-86A3-2348-B696-5ED5C9B2DC36}" type="datetimeFigureOut">
               <a:rPr kumimoji="1" lang="zh-CN" altLang="en-US" smtClean="0"/>
-              <a:t>2019/5/31</a:t>
+              <a:t>2019/6/6</a:t>
             </a:fld>
             <a:endParaRPr kumimoji="1" lang="zh-CN" altLang="en-US"/>
           </a:p>
@@ -1281,7 +1281,7 @@
           <a:p>
             <a:fld id="{1FBF89B6-86A3-2348-B696-5ED5C9B2DC36}" type="datetimeFigureOut">
               <a:rPr kumimoji="1" lang="zh-CN" altLang="en-US" smtClean="0"/>
-              <a:t>2019/5/31</a:t>
+              <a:t>2019/6/6</a:t>
             </a:fld>
             <a:endParaRPr kumimoji="1" lang="zh-CN" altLang="en-US"/>
           </a:p>
@@ -1649,7 +1649,7 @@
           <a:p>
             <a:fld id="{1FBF89B6-86A3-2348-B696-5ED5C9B2DC36}" type="datetimeFigureOut">
               <a:rPr kumimoji="1" lang="zh-CN" altLang="en-US" smtClean="0"/>
-              <a:t>2019/5/31</a:t>
+              <a:t>2019/6/6</a:t>
             </a:fld>
             <a:endParaRPr kumimoji="1" lang="zh-CN" altLang="en-US"/>
           </a:p>
@@ -1790,7 +1790,7 @@
           <a:p>
             <a:fld id="{1FBF89B6-86A3-2348-B696-5ED5C9B2DC36}" type="datetimeFigureOut">
               <a:rPr kumimoji="1" lang="zh-CN" altLang="en-US" smtClean="0"/>
-              <a:t>2019/5/31</a:t>
+              <a:t>2019/6/6</a:t>
             </a:fld>
             <a:endParaRPr kumimoji="1" lang="zh-CN" altLang="en-US"/>
           </a:p>
@@ -1903,7 +1903,7 @@
           <a:p>
             <a:fld id="{1FBF89B6-86A3-2348-B696-5ED5C9B2DC36}" type="datetimeFigureOut">
               <a:rPr kumimoji="1" lang="zh-CN" altLang="en-US" smtClean="0"/>
-              <a:t>2019/5/31</a:t>
+              <a:t>2019/6/6</a:t>
             </a:fld>
             <a:endParaRPr kumimoji="1" lang="zh-CN" altLang="en-US"/>
           </a:p>
@@ -2192,7 +2192,7 @@
           <a:p>
             <a:fld id="{1FBF89B6-86A3-2348-B696-5ED5C9B2DC36}" type="datetimeFigureOut">
               <a:rPr kumimoji="1" lang="zh-CN" altLang="en-US" smtClean="0"/>
-              <a:t>2019/5/31</a:t>
+              <a:t>2019/6/6</a:t>
             </a:fld>
             <a:endParaRPr kumimoji="1" lang="zh-CN" altLang="en-US"/>
           </a:p>
@@ -2483,7 +2483,7 @@
           <a:p>
             <a:fld id="{1FBF89B6-86A3-2348-B696-5ED5C9B2DC36}" type="datetimeFigureOut">
               <a:rPr kumimoji="1" lang="zh-CN" altLang="en-US" smtClean="0"/>
-              <a:t>2019/5/31</a:t>
+              <a:t>2019/6/6</a:t>
             </a:fld>
             <a:endParaRPr kumimoji="1" lang="zh-CN" altLang="en-US"/>
           </a:p>
@@ -2699,7 +2699,7 @@
           <a:p>
             <a:fld id="{1FBF89B6-86A3-2348-B696-5ED5C9B2DC36}" type="datetimeFigureOut">
               <a:rPr kumimoji="1" lang="zh-CN" altLang="en-US" smtClean="0"/>
-              <a:t>2019/5/31</a:t>
+              <a:t>2019/6/6</a:t>
             </a:fld>
             <a:endParaRPr kumimoji="1" lang="zh-CN" altLang="en-US"/>
           </a:p>
@@ -3176,6 +3176,126 @@
           </a:prstGeom>
         </p:spPr>
       </p:pic>
+      <p:pic>
+        <p:nvPicPr>
+          <p:cNvPr id="3" name="图片 2">
+            <a:extLst>
+              <a:ext uri="{FF2B5EF4-FFF2-40B4-BE49-F238E27FC236}">
+                <a16:creationId xmlns:a16="http://schemas.microsoft.com/office/drawing/2014/main" id="{95EF952E-9113-8A41-8DA6-65C60191C799}"/>
+              </a:ext>
+            </a:extLst>
+          </p:cNvPr>
+          <p:cNvPicPr>
+            <a:picLocks noChangeAspect="1"/>
+          </p:cNvPicPr>
+          <p:nvPr/>
+        </p:nvPicPr>
+        <p:blipFill>
+          <a:blip r:embed="rId4"/>
+          <a:stretch>
+            <a:fillRect/>
+          </a:stretch>
+        </p:blipFill>
+        <p:spPr>
+          <a:xfrm rot="7342747">
+            <a:off x="7286607" y="1712143"/>
+            <a:ext cx="2689908" cy="1344954"/>
+          </a:xfrm>
+          <a:prstGeom prst="rect">
+            <a:avLst/>
+          </a:prstGeom>
+        </p:spPr>
+      </p:pic>
+      <p:pic>
+        <p:nvPicPr>
+          <p:cNvPr id="6" name="图片 5">
+            <a:extLst>
+              <a:ext uri="{FF2B5EF4-FFF2-40B4-BE49-F238E27FC236}">
+                <a16:creationId xmlns:a16="http://schemas.microsoft.com/office/drawing/2014/main" id="{47110DB1-3FE6-1D49-83BF-7C3C492808AE}"/>
+              </a:ext>
+            </a:extLst>
+          </p:cNvPr>
+          <p:cNvPicPr>
+            <a:picLocks noChangeAspect="1"/>
+          </p:cNvPicPr>
+          <p:nvPr/>
+        </p:nvPicPr>
+        <p:blipFill>
+          <a:blip r:embed="rId4"/>
+          <a:stretch>
+            <a:fillRect/>
+          </a:stretch>
+        </p:blipFill>
+        <p:spPr>
+          <a:xfrm rot="3933514">
+            <a:off x="2429849" y="1273508"/>
+            <a:ext cx="2689908" cy="1344954"/>
+          </a:xfrm>
+          <a:prstGeom prst="rect">
+            <a:avLst/>
+          </a:prstGeom>
+        </p:spPr>
+      </p:pic>
+      <p:pic>
+        <p:nvPicPr>
+          <p:cNvPr id="8" name="图片 7">
+            <a:extLst>
+              <a:ext uri="{FF2B5EF4-FFF2-40B4-BE49-F238E27FC236}">
+                <a16:creationId xmlns:a16="http://schemas.microsoft.com/office/drawing/2014/main" id="{FDB3EDA9-F142-D541-8DCF-89D08AD4C916}"/>
+              </a:ext>
+            </a:extLst>
+          </p:cNvPr>
+          <p:cNvPicPr>
+            <a:picLocks noChangeAspect="1"/>
+          </p:cNvPicPr>
+          <p:nvPr/>
+        </p:nvPicPr>
+        <p:blipFill>
+          <a:blip r:embed="rId4"/>
+          <a:stretch>
+            <a:fillRect/>
+          </a:stretch>
+        </p:blipFill>
+        <p:spPr>
+          <a:xfrm rot="173788">
+            <a:off x="3145233" y="658555"/>
+            <a:ext cx="5031065" cy="1686210"/>
+          </a:xfrm>
+          <a:prstGeom prst="rect">
+            <a:avLst/>
+          </a:prstGeom>
+        </p:spPr>
+      </p:pic>
+      <p:pic>
+        <p:nvPicPr>
+          <p:cNvPr id="9" name="图片 8">
+            <a:extLst>
+              <a:ext uri="{FF2B5EF4-FFF2-40B4-BE49-F238E27FC236}">
+                <a16:creationId xmlns:a16="http://schemas.microsoft.com/office/drawing/2014/main" id="{47DCC116-4CFE-E647-AB19-F13350A197EC}"/>
+              </a:ext>
+            </a:extLst>
+          </p:cNvPr>
+          <p:cNvPicPr>
+            <a:picLocks noChangeAspect="1"/>
+          </p:cNvPicPr>
+          <p:nvPr/>
+        </p:nvPicPr>
+        <p:blipFill>
+          <a:blip r:embed="rId5"/>
+          <a:stretch>
+            <a:fillRect/>
+          </a:stretch>
+        </p:blipFill>
+        <p:spPr>
+          <a:xfrm rot="5400000">
+            <a:off x="3826828" y="5707328"/>
+            <a:ext cx="1549673" cy="1284189"/>
+          </a:xfrm>
+          <a:prstGeom prst="rect">
+            <a:avLst/>
+          </a:prstGeom>
+        </p:spPr>
+      </p:pic>
     </p:spTree>
     <p:extLst>
       <p:ext uri="{BB962C8B-B14F-4D97-AF65-F5344CB8AC3E}">

</xml_diff>